<commit_message>
Minor alteration to deck
</commit_message>
<xml_diff>
--- a/Documents/Deck/Reproducable Research.pptx
+++ b/Documents/Deck/Reproducable Research.pptx
@@ -334,7 +334,7 @@
           <a:p>
             <a:fld id="{ECD19FB2-3AAB-4D03-B13A-2960828C78E3}" type="datetimeFigureOut">
               <a:rPr lang="en-US" dirty="0"/>
-              <a:t>10/30/2017</a:t>
+              <a:t>10/31/2017</a:t>
             </a:fld>
             <a:endParaRPr lang="en-US" dirty="0"/>
           </a:p>
@@ -615,7 +615,7 @@
           <a:p>
             <a:fld id="{1B80C674-7DFC-42FE-B9CD-82963CDB1557}" type="datetimeFigureOut">
               <a:rPr lang="en-US" dirty="0"/>
-              <a:t>10/30/2017</a:t>
+              <a:t>10/31/2017</a:t>
             </a:fld>
             <a:endParaRPr lang="en-US" dirty="0"/>
           </a:p>
@@ -806,7 +806,7 @@
           <a:p>
             <a:fld id="{2076456F-F47D-4F25-8053-2A695DA0CA7D}" type="datetimeFigureOut">
               <a:rPr lang="en-US" dirty="0"/>
-              <a:t>10/30/2017</a:t>
+              <a:t>10/31/2017</a:t>
             </a:fld>
             <a:endParaRPr lang="en-US" dirty="0"/>
           </a:p>
@@ -1066,7 +1066,7 @@
           <a:p>
             <a:fld id="{5D6C7379-69CC-4837-9905-BEBA22830C8A}" type="datetimeFigureOut">
               <a:rPr lang="en-US" dirty="0"/>
-              <a:t>10/30/2017</a:t>
+              <a:t>10/31/2017</a:t>
             </a:fld>
             <a:endParaRPr lang="en-US" dirty="0"/>
           </a:p>
@@ -1491,7 +1491,7 @@
           <a:p>
             <a:fld id="{49EB8B7E-8AEE-4F10-BFEE-C999AD004D36}" type="datetimeFigureOut">
               <a:rPr lang="en-US" dirty="0"/>
-              <a:t>10/30/2017</a:t>
+              <a:t>10/31/2017</a:t>
             </a:fld>
             <a:endParaRPr lang="en-US" dirty="0"/>
           </a:p>
@@ -2036,7 +2036,7 @@
           <a:p>
             <a:fld id="{8668F3F9-58BC-440B-B37B-805B9055EF92}" type="datetimeFigureOut">
               <a:rPr lang="en-US" dirty="0"/>
-              <a:t>10/30/2017</a:t>
+              <a:t>10/31/2017</a:t>
             </a:fld>
             <a:endParaRPr lang="en-US" dirty="0"/>
           </a:p>
@@ -2866,7 +2866,7 @@
           <a:p>
             <a:fld id="{0D5A53AF-48EA-489D-8260-9DCAB666386A}" type="datetimeFigureOut">
               <a:rPr lang="en-US" dirty="0"/>
-              <a:t>10/30/2017</a:t>
+              <a:t>10/31/2017</a:t>
             </a:fld>
             <a:endParaRPr lang="en-US" dirty="0"/>
           </a:p>
@@ -3035,7 +3035,7 @@
           <a:p>
             <a:fld id="{0DED02AE-B9A4-47BD-AF8E-97E16144138B}" type="datetimeFigureOut">
               <a:rPr lang="en-US" dirty="0"/>
-              <a:t>10/30/2017</a:t>
+              <a:t>10/31/2017</a:t>
             </a:fld>
             <a:endParaRPr lang="en-US" dirty="0"/>
           </a:p>
@@ -3214,7 +3214,7 @@
           <a:p>
             <a:fld id="{CF0FD78B-DB02-4362-BCDC-98A55456977C}" type="datetimeFigureOut">
               <a:rPr lang="en-US" dirty="0"/>
-              <a:t>10/30/2017</a:t>
+              <a:t>10/31/2017</a:t>
             </a:fld>
             <a:endParaRPr lang="en-US" dirty="0"/>
           </a:p>
@@ -3383,7 +3383,7 @@
           <a:p>
             <a:fld id="{99916976-5D93-46E4-A98A-FAD63E4D0EA8}" type="datetimeFigureOut">
               <a:rPr lang="en-US" dirty="0"/>
-              <a:t>10/30/2017</a:t>
+              <a:t>10/31/2017</a:t>
             </a:fld>
             <a:endParaRPr lang="en-US" dirty="0"/>
           </a:p>
@@ -3639,7 +3639,7 @@
           <a:p>
             <a:fld id="{0F39F4F5-F4D2-4D2A-AB60-88D37ADCB869}" type="datetimeFigureOut">
               <a:rPr lang="en-US" dirty="0"/>
-              <a:t>10/30/2017</a:t>
+              <a:t>10/31/2017</a:t>
             </a:fld>
             <a:endParaRPr lang="en-US" dirty="0"/>
           </a:p>
@@ -3870,7 +3870,7 @@
           <a:p>
             <a:fld id="{D23BC6CE-6D1E-47E5-8859-F31AC5380EB2}" type="datetimeFigureOut">
               <a:rPr lang="en-US" dirty="0"/>
-              <a:t>10/30/2017</a:t>
+              <a:t>10/31/2017</a:t>
             </a:fld>
             <a:endParaRPr lang="en-US" dirty="0"/>
           </a:p>
@@ -4262,7 +4262,7 @@
           <a:p>
             <a:fld id="{B1B4E7C4-4DA4-404D-9965-B13F2DD7D8BF}" type="datetimeFigureOut">
               <a:rPr lang="en-US" dirty="0"/>
-              <a:t>10/30/2017</a:t>
+              <a:t>10/31/2017</a:t>
             </a:fld>
             <a:endParaRPr lang="en-US" dirty="0"/>
           </a:p>
@@ -4379,7 +4379,7 @@
           <a:p>
             <a:fld id="{476FB7AA-4A53-424F-AD41-70827B6504BA}" type="datetimeFigureOut">
               <a:rPr lang="en-US" dirty="0"/>
-              <a:t>10/30/2017</a:t>
+              <a:t>10/31/2017</a:t>
             </a:fld>
             <a:endParaRPr lang="en-US" dirty="0"/>
           </a:p>
@@ -4473,7 +4473,7 @@
           <a:p>
             <a:fld id="{E7884882-FB12-4BC8-9960-9AD8104D7FAE}" type="datetimeFigureOut">
               <a:rPr lang="en-US" dirty="0"/>
-              <a:t>10/30/2017</a:t>
+              <a:t>10/31/2017</a:t>
             </a:fld>
             <a:endParaRPr lang="en-US" dirty="0"/>
           </a:p>
@@ -4745,7 +4745,7 @@
           <a:p>
             <a:fld id="{F7D1BD23-6E54-4D9D-AD88-A2813C73CC25}" type="datetimeFigureOut">
               <a:rPr lang="en-US" dirty="0"/>
-              <a:t>10/30/2017</a:t>
+              <a:t>10/31/2017</a:t>
             </a:fld>
             <a:endParaRPr lang="en-US" dirty="0"/>
           </a:p>
@@ -5025,7 +5025,7 @@
           <a:p>
             <a:fld id="{1471A834-4F3C-4AF9-9C74-05EC35A0F292}" type="datetimeFigureOut">
               <a:rPr lang="en-US" dirty="0"/>
-              <a:t>10/30/2017</a:t>
+              <a:t>10/31/2017</a:t>
             </a:fld>
             <a:endParaRPr lang="en-US" dirty="0"/>
           </a:p>
@@ -5264,7 +5264,7 @@
           <a:p>
             <a:fld id="{51CF1133-3259-4C45-BABA-5B62D9C6F78D}" type="datetimeFigureOut">
               <a:rPr lang="en-US" dirty="0"/>
-              <a:t>10/30/2017</a:t>
+              <a:t>10/31/2017</a:t>
             </a:fld>
             <a:endParaRPr lang="en-US" dirty="0"/>
           </a:p>
@@ -5852,7 +5852,7 @@
             <a:pPr algn="ctr"/>
             <a:r>
               <a:rPr lang="en-US" sz="5400" b="1" dirty="0"/>
-              <a:t>Reproducible Research w/ Tidyverse</a:t>
+              <a:t>Reproducible Research with R, The Tidyverse, Notebooks, and Spark</a:t>
             </a:r>
           </a:p>
         </p:txBody>

</xml_diff>